<commit_message>
Update on ppt version 1
</commit_message>
<xml_diff>
--- a/BST/Geometric Applications/Rectangle Intersection by Geornoiu Dragos/Rectangle intersection version 1.pptx
+++ b/BST/Geometric Applications/Rectangle Intersection by Geornoiu Dragos/Rectangle intersection version 1.pptx
@@ -201,7 +201,7 @@
             <a:fld id="{3EB68856-1EBE-4EF1-9566-51FD3A06B696}" type="datetimeFigureOut">
               <a:rPr lang="en-US" smtClean="0"/>
               <a:pPr/>
-              <a:t>4/16/2014</a:t>
+              <a:t>4/17/2014</a:t>
             </a:fld>
             <a:endParaRPr lang="en-US"/>
           </a:p>
@@ -759,7 +759,7 @@
             <a:fld id="{1D8BD707-D9CF-40AE-B4C6-C98DA3205C09}" type="datetimeFigureOut">
               <a:rPr lang="en-US" smtClean="0"/>
               <a:pPr/>
-              <a:t>4/16/2014</a:t>
+              <a:t>4/17/2014</a:t>
             </a:fld>
             <a:endParaRPr lang="en-US"/>
           </a:p>
@@ -952,7 +952,7 @@
             <a:fld id="{1D8BD707-D9CF-40AE-B4C6-C98DA3205C09}" type="datetimeFigureOut">
               <a:rPr lang="en-US" smtClean="0"/>
               <a:pPr/>
-              <a:t>4/16/2014</a:t>
+              <a:t>4/17/2014</a:t>
             </a:fld>
             <a:endParaRPr lang="en-US"/>
           </a:p>
@@ -1139,7 +1139,7 @@
             <a:fld id="{1D8BD707-D9CF-40AE-B4C6-C98DA3205C09}" type="datetimeFigureOut">
               <a:rPr lang="en-US" smtClean="0"/>
               <a:pPr/>
-              <a:t>4/16/2014</a:t>
+              <a:t>4/17/2014</a:t>
             </a:fld>
             <a:endParaRPr lang="en-US"/>
           </a:p>
@@ -1404,7 +1404,7 @@
             <a:fld id="{1D8BD707-D9CF-40AE-B4C6-C98DA3205C09}" type="datetimeFigureOut">
               <a:rPr lang="en-US" smtClean="0"/>
               <a:pPr/>
-              <a:t>4/16/2014</a:t>
+              <a:t>4/17/2014</a:t>
             </a:fld>
             <a:endParaRPr lang="en-US"/>
           </a:p>
@@ -1822,7 +1822,7 @@
             <a:fld id="{1D8BD707-D9CF-40AE-B4C6-C98DA3205C09}" type="datetimeFigureOut">
               <a:rPr lang="en-US" smtClean="0"/>
               <a:pPr/>
-              <a:t>4/16/2014</a:t>
+              <a:t>4/17/2014</a:t>
             </a:fld>
             <a:endParaRPr lang="en-US"/>
           </a:p>
@@ -2066,7 +2066,7 @@
             <a:fld id="{1D8BD707-D9CF-40AE-B4C6-C98DA3205C09}" type="datetimeFigureOut">
               <a:rPr lang="en-US" smtClean="0"/>
               <a:pPr/>
-              <a:t>4/16/2014</a:t>
+              <a:t>4/17/2014</a:t>
             </a:fld>
             <a:endParaRPr lang="en-US"/>
           </a:p>
@@ -2304,7 +2304,7 @@
             <a:fld id="{1D8BD707-D9CF-40AE-B4C6-C98DA3205C09}" type="datetimeFigureOut">
               <a:rPr lang="en-US" smtClean="0"/>
               <a:pPr/>
-              <a:t>4/16/2014</a:t>
+              <a:t>4/17/2014</a:t>
             </a:fld>
             <a:endParaRPr lang="en-US"/>
           </a:p>
@@ -2501,7 +2501,7 @@
             <a:fld id="{1D8BD707-D9CF-40AE-B4C6-C98DA3205C09}" type="datetimeFigureOut">
               <a:rPr lang="en-US" smtClean="0"/>
               <a:pPr/>
-              <a:t>4/16/2014</a:t>
+              <a:t>4/17/2014</a:t>
             </a:fld>
             <a:endParaRPr lang="en-US"/>
           </a:p>
@@ -2601,7 +2601,7 @@
             <a:fld id="{1D8BD707-D9CF-40AE-B4C6-C98DA3205C09}" type="datetimeFigureOut">
               <a:rPr lang="en-US" smtClean="0"/>
               <a:pPr/>
-              <a:t>4/16/2014</a:t>
+              <a:t>4/17/2014</a:t>
             </a:fld>
             <a:endParaRPr lang="en-US"/>
           </a:p>
@@ -2739,7 +2739,7 @@
             <a:fld id="{1D8BD707-D9CF-40AE-B4C6-C98DA3205C09}" type="datetimeFigureOut">
               <a:rPr lang="en-US" smtClean="0"/>
               <a:pPr/>
-              <a:t>4/16/2014</a:t>
+              <a:t>4/17/2014</a:t>
             </a:fld>
             <a:endParaRPr lang="en-US"/>
           </a:p>
@@ -3259,7 +3259,7 @@
             <a:fld id="{1D8BD707-D9CF-40AE-B4C6-C98DA3205C09}" type="datetimeFigureOut">
               <a:rPr lang="en-US" smtClean="0"/>
               <a:pPr/>
-              <a:t>4/16/2014</a:t>
+              <a:t>4/17/2014</a:t>
             </a:fld>
             <a:endParaRPr lang="en-US"/>
           </a:p>
@@ -3522,7 +3522,7 @@
             <a:fld id="{1D8BD707-D9CF-40AE-B4C6-C98DA3205C09}" type="datetimeFigureOut">
               <a:rPr lang="en-US" smtClean="0"/>
               <a:pPr/>
-              <a:t>4/16/2014</a:t>
+              <a:t>4/17/2014</a:t>
             </a:fld>
             <a:endParaRPr lang="en-US"/>
           </a:p>
@@ -4192,15 +4192,7 @@
                   <a:schemeClr val="tx1"/>
                 </a:solidFill>
               </a:rPr>
-              <a:t>Coordinator</a:t>
-            </a:r>
-            <a:r>
-              <a:rPr lang="en-US" dirty="0" smtClean="0">
-                <a:solidFill>
-                  <a:schemeClr val="tx1"/>
-                </a:solidFill>
-              </a:rPr>
-              <a:t>: </a:t>
+              <a:t>Coordinator: </a:t>
             </a:r>
             <a:r>
               <a:rPr lang="en-US" dirty="0" err="1" smtClean="0">
@@ -4580,26 +4572,35 @@
       </p:sp>
       <p:pic>
         <p:nvPicPr>
-          <p:cNvPr id="4" name="Content Placeholder 7" descr="stepbystep.png"/>
+          <p:cNvPr id="28673" name="Picture 1"/>
           <p:cNvPicPr>
-            <a:picLocks noChangeAspect="1"/>
+            <a:picLocks noChangeAspect="1" noChangeArrowheads="1"/>
           </p:cNvPicPr>
           <p:nvPr/>
         </p:nvPicPr>
         <p:blipFill>
           <a:blip r:embed="rId2" cstate="print"/>
+          <a:srcRect/>
           <a:stretch>
             <a:fillRect/>
           </a:stretch>
         </p:blipFill>
-        <p:spPr>
+        <p:spPr bwMode="auto">
           <a:xfrm>
             <a:off x="0" y="1524000"/>
-            <a:ext cx="9144000" cy="5334000"/>
+            <a:ext cx="9153525" cy="5334000"/>
           </a:xfrm>
           <a:prstGeom prst="rect">
             <a:avLst/>
           </a:prstGeom>
+          <a:noFill/>
+          <a:ln w="9525">
+            <a:noFill/>
+            <a:miter lim="800000"/>
+            <a:headEnd/>
+            <a:tailEnd/>
+          </a:ln>
+          <a:effectLst/>
         </p:spPr>
       </p:pic>
     </p:spTree>
@@ -5404,11 +5405,7 @@
             </a:pPr>
             <a:r>
               <a:rPr lang="en-US" sz="2400" b="1" dirty="0" smtClean="0"/>
-              <a:t>For code</a:t>
-            </a:r>
-            <a:r>
-              <a:rPr lang="en-US" sz="2400" b="1" dirty="0" smtClean="0"/>
-              <a:t>, visit: </a:t>
+              <a:t>For code, visit: </a:t>
             </a:r>
             <a:r>
               <a:rPr lang="en-US" sz="2000" dirty="0" smtClean="0"/>
@@ -5443,6 +5440,13 @@
   <p:clrMapOvr>
     <a:masterClrMapping/>
   </p:clrMapOvr>
+  <p:timing>
+    <p:tnLst>
+      <p:par>
+        <p:cTn id="1" dur="indefinite" restart="never" nodeType="tmRoot"/>
+      </p:par>
+    </p:tnLst>
+  </p:timing>
 </p:sld>
 </file>
 

</xml_diff>